<commit_message>
Update date and fix title typo
</commit_message>
<xml_diff>
--- a/presentation.pptx
+++ b/presentation.pptx
@@ -287,7 +287,7 @@
           </a:bodyPr>
           <a:p>
             <a:pPr algn="r"/>
-            <a:fld id="{7934AF9C-317C-42E5-9CCB-8A1421831A57}" type="slidenum">
+            <a:fld id="{94EBE1DC-4CE7-4FC9-86FF-EDEF55AA1AF1}" type="slidenum">
               <a:rPr b="0" lang="en-US" sz="1400" spc="-1" strike="noStrike">
                 <a:latin typeface="Arial"/>
               </a:rPr>
@@ -4200,7 +4200,7 @@
           </a:bodyPr>
           <a:p>
             <a:pPr algn="r"/>
-            <a:fld id="{20FE1067-EDD9-47F5-8542-443D0DD739CD}" type="slidenum">
+            <a:fld id="{27E21D5B-E275-4CF0-9FD1-8817DF020E78}" type="slidenum">
               <a:rPr b="0" lang="en-US" sz="1400" spc="-1" strike="noStrike">
                 <a:latin typeface="Arial"/>
               </a:rPr>
@@ -4236,7 +4236,7 @@
             <a:spAutoFit/>
           </a:bodyPr>
           <a:p>
-            <a:fld id="{AD500B04-0DD9-46D1-BCDF-91F194230597}" type="slidenum">
+            <a:fld id="{99AEB98B-4A2B-43EF-9123-CF63AC942CDA}" type="slidenum">
               <a:rPr b="0" lang="en-US" sz="1800" spc="-1" strike="noStrike">
                 <a:latin typeface="Arial"/>
               </a:rPr>
@@ -4347,7 +4347,7 @@
               <a:rPr b="0" lang="en-US" sz="4000" spc="-1" strike="noStrike">
                 <a:latin typeface="Cantarell"/>
               </a:rPr>
-              <a:t>Introduction to Blokchains</a:t>
+              <a:t>Introduction to Blockchains</a:t>
             </a:r>
             <a:endParaRPr b="0" lang="en-US" sz="4000" spc="-1" strike="noStrike">
               <a:latin typeface="Arial"/>
@@ -4401,7 +4401,7 @@
               <a:rPr b="0" lang="en-US" sz="2400" spc="-1" strike="noStrike">
                 <a:latin typeface="Cantarell"/>
               </a:rPr>
-              <a:t>2/10/2018</a:t>
+              <a:t>11/10/2019</a:t>
             </a:r>
             <a:endParaRPr b="0" lang="en-US" sz="2400" spc="-1" strike="noStrike">
               <a:latin typeface="Arial"/>

</xml_diff>